<commit_message>
[2023-03-02] RMS(v3.0) - 보고내용 순서 변경 기능 추가
</commit_message>
<xml_diff>
--- a/src/main/webapp/WEB-INF/Files/2023-02/10.calendar02.pptx
+++ b/src/main/webapp/WEB-INF/Files/2023-02/10.calendar02.pptx
@@ -28486,6 +28486,145 @@
           </a:graphicData>
         </a:graphic>
       </p:graphicFrame>
+      <p:sp>
+        <p:nvSpPr>
+          <p:cNvPr name="TextBox 2" id="2"/>
+          <p:cNvSpPr txBox="true"/>
+          <p:nvPr/>
+        </p:nvSpPr>
+        <p:spPr>
+          <a:xfrm>
+            <a:off x="5617325" y="723011"/>
+            <a:ext cx="659156" cy="357021"/>
+          </a:xfrm>
+          <a:prstGeom prst="rect">
+            <a:avLst/>
+          </a:prstGeom>
+        </p:spPr>
+        <p:txBody>
+          <a:bodyPr anchor="t" rtlCol="false"/>
+          <a:lstStyle/>
+          <a:p>
+            <a:pPr algn="l">
+              <a:defRPr/>
+            </a:pPr>
+            <a:r>
+              <a:rPr lang="en-US" b="false" sz="930">
+                <a:solidFill>
+                  <a:srgbClr val="0000FF"/>
+                </a:solidFill>
+              </a:rPr>
+              <a:t> ◑ 반 차 
+ ● 1day</a:t>
+            </a:r>
+            <a:endParaRPr lang="ko-KR"/>
+          </a:p>
+        </p:txBody>
+      </p:sp>
+      <p:sp>
+        <p:nvSpPr>
+          <p:cNvPr name="TextBox 3" id="3"/>
+          <p:cNvSpPr txBox="true"/>
+          <p:nvPr/>
+        </p:nvSpPr>
+        <p:spPr>
+          <a:xfrm>
+            <a:off x="6742494" y="727672"/>
+            <a:ext cx="1416683" cy="349839"/>
+          </a:xfrm>
+          <a:prstGeom prst="rect">
+            <a:avLst/>
+          </a:prstGeom>
+        </p:spPr>
+        <p:txBody>
+          <a:bodyPr anchor="t" rtlCol="false"/>
+          <a:lstStyle/>
+          <a:p>
+            <a:pPr algn="l">
+              <a:defRPr/>
+            </a:pPr>
+            <a:r>
+              <a:rPr lang="en-US" b="false" sz="930">
+                <a:solidFill>
+                  <a:srgbClr val="0000FF"/>
+                </a:solidFill>
+              </a:rPr>
+              <a:t>예비군/민방위 훈련 
+교육, 내부회의 </a:t>
+            </a:r>
+            <a:endParaRPr lang="ko-KR"/>
+          </a:p>
+        </p:txBody>
+      </p:sp>
+      <p:sp>
+        <p:nvSpPr>
+          <p:cNvPr name="TextBox 4" id="4"/>
+          <p:cNvSpPr txBox="true"/>
+          <p:nvPr/>
+        </p:nvSpPr>
+        <p:spPr>
+          <a:xfrm>
+            <a:off x="7795686" y="723011"/>
+            <a:ext cx="1640370" cy="349839"/>
+          </a:xfrm>
+          <a:prstGeom prst="rect">
+            <a:avLst/>
+          </a:prstGeom>
+        </p:spPr>
+        <p:txBody>
+          <a:bodyPr anchor="t" rtlCol="false"/>
+          <a:lstStyle/>
+          <a:p>
+            <a:pPr algn="l">
+              <a:defRPr/>
+            </a:pPr>
+            <a:r>
+              <a:rPr lang="en-US" b="false" sz="930">
+                <a:solidFill>
+                  <a:srgbClr val="0000FF"/>
+                </a:solidFill>
+              </a:rPr>
+              <a:t>경조휴가
+건강검진</a:t>
+            </a:r>
+            <a:endParaRPr lang="ko-KR"/>
+          </a:p>
+        </p:txBody>
+      </p:sp>
+      <p:sp>
+        <p:nvSpPr>
+          <p:cNvPr name="TextBox 6" id="6"/>
+          <p:cNvSpPr txBox="true"/>
+          <p:nvPr/>
+        </p:nvSpPr>
+        <p:spPr>
+          <a:xfrm>
+            <a:off x="809379" y="6340559"/>
+            <a:ext cx="3025187" cy="221086"/>
+          </a:xfrm>
+          <a:prstGeom prst="rect">
+            <a:avLst/>
+          </a:prstGeom>
+        </p:spPr>
+        <p:txBody>
+          <a:bodyPr anchor="t" rtlCol="false"/>
+          <a:lstStyle/>
+          <a:p>
+            <a:pPr algn="l">
+              <a:defRPr/>
+            </a:pPr>
+            <a:r>
+              <a:rPr lang="en-US" b="false" sz="880">
+                <a:solidFill>
+                  <a:srgbClr val="000000"/>
+                </a:solidFill>
+              </a:rPr>
+              <a:t>(H) IT운영팀  (R) 생산IT지원팀  (B) Baynex   (Q) Quintet</a:t>
+            </a:r>
+            <a:endParaRPr lang="ko-KR"/>
+          </a:p>
+        </p:txBody>
+      </p:sp>
     </p:spTree>
     <p:extLst>
       <p:ext uri="{BB962C8B-B14F-4D97-AF65-F5344CB8AC3E}">

</xml_diff>